<commit_message>
Update Presentation - Activity A - Method of Manufacture.pptx
</commit_message>
<xml_diff>
--- a/OU/Presentation - Activity A - Method of Manufacture.pptx
+++ b/OU/Presentation - Activity A - Method of Manufacture.pptx
@@ -6226,7 +6226,7 @@
           </a:p>
           <a:p>
             <a:r>
-              <a:rPr lang="en-GB" sz="1800" b="1">
+              <a:rPr lang="en-GB" sz="1800" b="1" dirty="0">
                 <a:solidFill>
                   <a:schemeClr val="bg1">
                     <a:lumMod val="95000"/>
@@ -6235,6 +6235,228 @@
               </a:rPr>
               <a:t>References:</a:t>
             </a:r>
+          </a:p>
+          <a:p>
+            <a:endParaRPr lang="en-GB" sz="1800" b="1" dirty="0">
+              <a:solidFill>
+                <a:schemeClr val="bg1">
+                  <a:lumMod val="95000"/>
+                </a:schemeClr>
+              </a:solidFill>
+            </a:endParaRPr>
+          </a:p>
+          <a:p>
+            <a:pPr marL="457200" indent="-457200">
+              <a:lnSpc>
+                <a:spcPct val="107000"/>
+              </a:lnSpc>
+              <a:spcBef>
+                <a:spcPts val="800"/>
+              </a:spcBef>
+            </a:pPr>
+            <a:r>
+              <a:rPr lang="en-GB" sz="1400" dirty="0">
+                <a:solidFill>
+                  <a:schemeClr val="bg1">
+                    <a:lumMod val="95000"/>
+                  </a:schemeClr>
+                </a:solidFill>
+                <a:effectLst/>
+                <a:latin typeface="Calibri" panose="020F0502020204030204" pitchFamily="34" charset="0"/>
+                <a:ea typeface="Segoe UI" panose="020B0502040204020203" pitchFamily="34" charset="0"/>
+              </a:rPr>
+              <a:t>British Plastics Federation. (2021). </a:t>
+            </a:r>
+            <a:r>
+              <a:rPr lang="en-GB" sz="1400" i="1" dirty="0">
+                <a:solidFill>
+                  <a:schemeClr val="bg1">
+                    <a:lumMod val="95000"/>
+                  </a:schemeClr>
+                </a:solidFill>
+                <a:effectLst/>
+                <a:latin typeface="Calibri" panose="020F0502020204030204" pitchFamily="34" charset="0"/>
+                <a:ea typeface="Segoe UI" panose="020B0502040204020203" pitchFamily="34" charset="0"/>
+              </a:rPr>
+              <a:t>Plastic Recycling</a:t>
+            </a:r>
+            <a:r>
+              <a:rPr lang="en-GB" sz="1400" dirty="0">
+                <a:solidFill>
+                  <a:schemeClr val="bg1">
+                    <a:lumMod val="95000"/>
+                  </a:schemeClr>
+                </a:solidFill>
+                <a:effectLst/>
+                <a:latin typeface="Calibri" panose="020F0502020204030204" pitchFamily="34" charset="0"/>
+                <a:ea typeface="Segoe UI" panose="020B0502040204020203" pitchFamily="34" charset="0"/>
+              </a:rPr>
+              <a:t>. Retrieved July 24, 2021, from BPF.co.uk: https://www.bpf.co.uk/sustainability/plastics_recycling.aspx</a:t>
+            </a:r>
+          </a:p>
+          <a:p>
+            <a:pPr marL="457200" indent="-457200">
+              <a:lnSpc>
+                <a:spcPct val="107000"/>
+              </a:lnSpc>
+              <a:spcBef>
+                <a:spcPts val="800"/>
+              </a:spcBef>
+            </a:pPr>
+            <a:r>
+              <a:rPr lang="en-GB" sz="1400" dirty="0">
+                <a:solidFill>
+                  <a:schemeClr val="bg1">
+                    <a:lumMod val="95000"/>
+                  </a:schemeClr>
+                </a:solidFill>
+                <a:effectLst/>
+                <a:latin typeface="Calibri" panose="020F0502020204030204" pitchFamily="34" charset="0"/>
+                <a:ea typeface="Segoe UI" panose="020B0502040204020203" pitchFamily="34" charset="0"/>
+              </a:rPr>
+              <a:t>British Stainless Steel Association. (2021). </a:t>
+            </a:r>
+            <a:r>
+              <a:rPr lang="en-GB" sz="1400" i="1" dirty="0">
+                <a:solidFill>
+                  <a:schemeClr val="bg1">
+                    <a:lumMod val="95000"/>
+                  </a:schemeClr>
+                </a:solidFill>
+                <a:effectLst/>
+                <a:latin typeface="Calibri" panose="020F0502020204030204" pitchFamily="34" charset="0"/>
+                <a:ea typeface="Segoe UI" panose="020B0502040204020203" pitchFamily="34" charset="0"/>
+              </a:rPr>
+              <a:t>ENVIRONMENTAL ASPECTS OF STAINLESS STEEL</a:t>
+            </a:r>
+            <a:r>
+              <a:rPr lang="en-GB" sz="1400" dirty="0">
+                <a:solidFill>
+                  <a:schemeClr val="bg1">
+                    <a:lumMod val="95000"/>
+                  </a:schemeClr>
+                </a:solidFill>
+                <a:effectLst/>
+                <a:latin typeface="Calibri" panose="020F0502020204030204" pitchFamily="34" charset="0"/>
+                <a:ea typeface="Segoe UI" panose="020B0502040204020203" pitchFamily="34" charset="0"/>
+              </a:rPr>
+              <a:t>. Retrieved June 24, 2021, from BSSA.org: https://bssa.org.uk/bssa_articles/environmental-aspects-of-stainless-steel/</a:t>
+            </a:r>
+          </a:p>
+          <a:p>
+            <a:pPr marL="457200" indent="-457200">
+              <a:lnSpc>
+                <a:spcPct val="107000"/>
+              </a:lnSpc>
+              <a:spcBef>
+                <a:spcPts val="800"/>
+              </a:spcBef>
+            </a:pPr>
+            <a:r>
+              <a:rPr lang="en-GB" sz="1400" dirty="0" err="1">
+                <a:solidFill>
+                  <a:schemeClr val="bg1">
+                    <a:lumMod val="95000"/>
+                  </a:schemeClr>
+                </a:solidFill>
+                <a:effectLst/>
+                <a:latin typeface="Calibri" panose="020F0502020204030204" pitchFamily="34" charset="0"/>
+                <a:ea typeface="Segoe UI" panose="020B0502040204020203" pitchFamily="34" charset="0"/>
+              </a:rPr>
+              <a:t>Kidly</a:t>
+            </a:r>
+            <a:r>
+              <a:rPr lang="en-GB" sz="1400" dirty="0">
+                <a:solidFill>
+                  <a:schemeClr val="bg1">
+                    <a:lumMod val="95000"/>
+                  </a:schemeClr>
+                </a:solidFill>
+                <a:effectLst/>
+                <a:latin typeface="Calibri" panose="020F0502020204030204" pitchFamily="34" charset="0"/>
+                <a:ea typeface="Segoe UI" panose="020B0502040204020203" pitchFamily="34" charset="0"/>
+              </a:rPr>
+              <a:t>. (2021). </a:t>
+            </a:r>
+            <a:r>
+              <a:rPr lang="en-GB" sz="1400" i="1" dirty="0">
+                <a:solidFill>
+                  <a:schemeClr val="bg1">
+                    <a:lumMod val="95000"/>
+                  </a:schemeClr>
+                </a:solidFill>
+                <a:effectLst/>
+                <a:latin typeface="Calibri" panose="020F0502020204030204" pitchFamily="34" charset="0"/>
+                <a:ea typeface="Segoe UI" panose="020B0502040204020203" pitchFamily="34" charset="0"/>
+              </a:rPr>
+              <a:t>Non Spill Drinking Spout</a:t>
+            </a:r>
+            <a:r>
+              <a:rPr lang="en-GB" sz="1400" dirty="0">
+                <a:solidFill>
+                  <a:schemeClr val="bg1">
+                    <a:lumMod val="95000"/>
+                  </a:schemeClr>
+                </a:solidFill>
+                <a:effectLst/>
+                <a:latin typeface="Calibri" panose="020F0502020204030204" pitchFamily="34" charset="0"/>
+                <a:ea typeface="Segoe UI" panose="020B0502040204020203" pitchFamily="34" charset="0"/>
+              </a:rPr>
+              <a:t>. Retrieved July 24, 2021, from </a:t>
+            </a:r>
+            <a:r>
+              <a:rPr lang="en-GB" sz="1400" dirty="0" err="1">
+                <a:solidFill>
+                  <a:schemeClr val="bg1">
+                    <a:lumMod val="95000"/>
+                  </a:schemeClr>
+                </a:solidFill>
+                <a:effectLst/>
+                <a:latin typeface="Calibri" panose="020F0502020204030204" pitchFamily="34" charset="0"/>
+                <a:ea typeface="Segoe UI" panose="020B0502040204020203" pitchFamily="34" charset="0"/>
+              </a:rPr>
+              <a:t>Kidly</a:t>
+            </a:r>
+            <a:r>
+              <a:rPr lang="en-GB" sz="1400" dirty="0">
+                <a:solidFill>
+                  <a:schemeClr val="bg1">
+                    <a:lumMod val="95000"/>
+                  </a:schemeClr>
+                </a:solidFill>
+                <a:effectLst/>
+                <a:latin typeface="Calibri" panose="020F0502020204030204" pitchFamily="34" charset="0"/>
+                <a:ea typeface="Segoe UI" panose="020B0502040204020203" pitchFamily="34" charset="0"/>
+              </a:rPr>
+              <a:t>.</a:t>
+            </a:r>
+          </a:p>
+          <a:p>
+            <a:pPr>
+              <a:lnSpc>
+                <a:spcPct val="107000"/>
+              </a:lnSpc>
+              <a:spcBef>
+                <a:spcPts val="800"/>
+              </a:spcBef>
+            </a:pPr>
+            <a:r>
+              <a:rPr lang="en-GB" sz="1800" dirty="0">
+                <a:effectLst/>
+                <a:latin typeface="Calibri" panose="020F0502020204030204" pitchFamily="34" charset="0"/>
+                <a:ea typeface="Segoe UI" panose="020B0502040204020203" pitchFamily="34" charset="0"/>
+              </a:rPr>
+              <a:t> </a:t>
+            </a:r>
+          </a:p>
+          <a:p>
+            <a:endParaRPr lang="en-GB" sz="1800" b="1" dirty="0">
+              <a:solidFill>
+                <a:schemeClr val="bg1">
+                  <a:lumMod val="95000"/>
+                </a:schemeClr>
+              </a:solidFill>
+            </a:endParaRPr>
           </a:p>
           <a:p>
             <a:endParaRPr lang="en-GB" sz="1800" b="1" dirty="0">

</xml_diff>